<commit_message>
Adds description, news, fixes #2
</commit_message>
<xml_diff>
--- a/powerpoint-state/access-to-care-rmarkdown.pptx
+++ b/powerpoint-state/access-to-care-rmarkdown.pptx
@@ -312,7 +312,7 @@
           <a:p>
             <a:fld id="{96DFF08F-DC6B-4601-B491-B0F83F6DD2DA}" type="datetimeFigureOut">
               <a:rPr lang="en-US" dirty="0"/>
-              <a:t>3/31/2019</a:t>
+              <a:t>4/8/2019</a:t>
             </a:fld>
             <a:endParaRPr lang="en-US" dirty="0"/>
           </a:p>
@@ -533,7 +533,7 @@
           <a:p>
             <a:fld id="{96DFF08F-DC6B-4601-B491-B0F83F6DD2DA}" type="datetimeFigureOut">
               <a:rPr lang="en-US" dirty="0"/>
-              <a:t>3/31/2019</a:t>
+              <a:t>4/8/2019</a:t>
             </a:fld>
             <a:endParaRPr lang="en-US" dirty="0"/>
           </a:p>
@@ -713,7 +713,7 @@
           <a:p>
             <a:fld id="{96DFF08F-DC6B-4601-B491-B0F83F6DD2DA}" type="datetimeFigureOut">
               <a:rPr lang="en-US" dirty="0"/>
-              <a:t>3/31/2019</a:t>
+              <a:t>4/8/2019</a:t>
             </a:fld>
             <a:endParaRPr lang="en-US" dirty="0"/>
           </a:p>
@@ -830,7 +830,7 @@
           <a:p>
             <a:fld id="{96DFF08F-DC6B-4601-B491-B0F83F6DD2DA}" type="datetimeFigureOut">
               <a:rPr lang="en-US" dirty="0"/>
-              <a:t>3/31/2019</a:t>
+              <a:t>4/8/2019</a:t>
             </a:fld>
             <a:endParaRPr lang="en-US" dirty="0"/>
           </a:p>
@@ -1127,7 +1127,7 @@
           <a:p>
             <a:fld id="{96DFF08F-DC6B-4601-B491-B0F83F6DD2DA}" type="datetimeFigureOut">
               <a:rPr lang="en-US" dirty="0"/>
-              <a:t>3/31/2019</a:t>
+              <a:t>4/8/2019</a:t>
             </a:fld>
             <a:endParaRPr lang="en-US" dirty="0"/>
           </a:p>
@@ -1449,7 +1449,7 @@
           <a:p>
             <a:fld id="{96DFF08F-DC6B-4601-B491-B0F83F6DD2DA}" type="datetimeFigureOut">
               <a:rPr lang="en-US" dirty="0"/>
-              <a:t>3/31/2019</a:t>
+              <a:t>4/8/2019</a:t>
             </a:fld>
             <a:endParaRPr lang="en-US" dirty="0"/>
           </a:p>
@@ -1873,7 +1873,7 @@
           <a:p>
             <a:fld id="{96DFF08F-DC6B-4601-B491-B0F83F6DD2DA}" type="datetimeFigureOut">
               <a:rPr lang="en-US" dirty="0"/>
-              <a:t>3/31/2019</a:t>
+              <a:t>4/8/2019</a:t>
             </a:fld>
             <a:endParaRPr lang="en-US" dirty="0"/>
           </a:p>
@@ -1991,7 +1991,7 @@
           <a:p>
             <a:fld id="{96DFF08F-DC6B-4601-B491-B0F83F6DD2DA}" type="datetimeFigureOut">
               <a:rPr lang="en-US" dirty="0"/>
-              <a:t>3/31/2019</a:t>
+              <a:t>4/8/2019</a:t>
             </a:fld>
             <a:endParaRPr lang="en-US" dirty="0"/>
           </a:p>
@@ -2086,7 +2086,7 @@
           <a:p>
             <a:fld id="{96DFF08F-DC6B-4601-B491-B0F83F6DD2DA}" type="datetimeFigureOut">
               <a:rPr lang="en-US" dirty="0"/>
-              <a:t>3/31/2019</a:t>
+              <a:t>4/8/2019</a:t>
             </a:fld>
             <a:endParaRPr lang="en-US" dirty="0"/>
           </a:p>
@@ -2376,7 +2376,7 @@
           <a:p>
             <a:fld id="{96DFF08F-DC6B-4601-B491-B0F83F6DD2DA}" type="datetimeFigureOut">
               <a:rPr lang="en-US" dirty="0"/>
-              <a:t>3/31/2019</a:t>
+              <a:t>4/8/2019</a:t>
             </a:fld>
             <a:endParaRPr lang="en-US" dirty="0"/>
           </a:p>
@@ -2648,7 +2648,7 @@
           <a:p>
             <a:fld id="{96DFF08F-DC6B-4601-B491-B0F83F6DD2DA}" type="datetimeFigureOut">
               <a:rPr lang="en-US" dirty="0"/>
-              <a:t>3/31/2019</a:t>
+              <a:t>4/8/2019</a:t>
             </a:fld>
             <a:endParaRPr lang="en-US" dirty="0"/>
           </a:p>
@@ -2901,7 +2901,7 @@
             <a:fld id="{96DFF08F-DC6B-4601-B491-B0F83F6DD2DA}" type="datetimeFigureOut">
               <a:rPr lang="en-US" dirty="0"/>
               <a:pPr/>
-              <a:t>3/31/2019</a:t>
+              <a:t>4/8/2019</a:t>
             </a:fld>
             <a:endParaRPr lang="en-US" dirty="0"/>
           </a:p>
@@ -3383,44 +3383,11 @@
           <a:bodyPr/>
           <a:lstStyle/>
           <a:p>
-            <a:pPr lvl="0" marL="0" indent="0">
+            <a:pPr marL="0" lvl="0" indent="0">
               <a:buNone/>
             </a:pPr>
             <a:r>
-              <a:rPr/>
-              <a:t>Access</a:t>
-            </a:r>
-            <a:r>
-              <a:rPr/>
-              <a:t> </a:t>
-            </a:r>
-            <a:r>
-              <a:rPr/>
-              <a:t>to</a:t>
-            </a:r>
-            <a:r>
-              <a:rPr/>
-              <a:t> </a:t>
-            </a:r>
-            <a:r>
-              <a:rPr/>
-              <a:t>Care</a:t>
-            </a:r>
-            <a:r>
-              <a:rPr/>
-              <a:t> </a:t>
-            </a:r>
-            <a:r>
-              <a:rPr/>
-              <a:t>by</a:t>
-            </a:r>
-            <a:r>
-              <a:rPr/>
-              <a:t> </a:t>
-            </a:r>
-            <a:r>
-              <a:rPr/>
-              <a:t>State</a:t>
+              <a:t>Access to Care by State</a:t>
             </a:r>
           </a:p>
         </p:txBody>
@@ -3445,11 +3412,12 @@
           <a:bodyPr/>
           <a:lstStyle/>
           <a:p>
-            <a:pPr lvl="0" marL="0" indent="0">
+            <a:pPr marL="0" lvl="0" indent="0">
               <a:buNone/>
             </a:pPr>
             <a:br/>
             <a:br/>
+            <a:endParaRPr/>
           </a:p>
         </p:txBody>
       </p:sp>
@@ -3490,6 +3458,9 @@
       </p:cxnSp>
     </p:spTree>
   </p:cSld>
+  <p:clrMapOvr>
+    <a:masterClrMapping/>
+  </p:clrMapOvr>
 </p:sld>
 </file>
 
@@ -3530,11 +3501,10 @@
           <a:bodyPr/>
           <a:lstStyle/>
           <a:p>
-            <a:pPr lvl="0" marL="0" indent="0">
+            <a:pPr marL="0" lvl="0" indent="0">
               <a:buNone/>
             </a:pPr>
             <a:r>
-              <a:rPr/>
               <a:t>California</a:t>
             </a:r>
           </a:p>
@@ -3577,6 +3547,9 @@
       </p:cxnSp>
     </p:spTree>
   </p:cSld>
+  <p:clrMapOvr>
+    <a:masterClrMapping/>
+  </p:clrMapOvr>
 </p:sld>
 </file>
 
@@ -3612,11 +3585,10 @@
           <a:bodyPr/>
           <a:lstStyle/>
           <a:p>
-            <a:pPr lvl="0" marL="0" indent="0">
+            <a:pPr marL="0" lvl="0" indent="0">
               <a:buNone/>
             </a:pPr>
             <a:r>
-              <a:rPr/>
               <a:t>Background</a:t>
             </a:r>
           </a:p>
@@ -3643,11 +3615,10 @@
           <a:bodyPr/>
           <a:lstStyle/>
           <a:p>
-            <a:pPr lvl="0" marL="0" indent="0">
+            <a:pPr marL="0" lvl="0" indent="0">
               <a:buNone/>
             </a:pPr>
             <a:r>
-              <a:rPr/>
               <a:t>We are trying to determine which counties in </a:t>
             </a:r>
             <a:r>
@@ -3655,16 +3626,14 @@
               <a:t>California</a:t>
             </a:r>
             <a:r>
-              <a:rPr/>
               <a:t> have comparatively more access or less access to hospital care.</a:t>
             </a:r>
           </a:p>
           <a:p>
-            <a:pPr lvl="0" marL="0" indent="0">
+            <a:pPr marL="0" lvl="0" indent="0">
               <a:buNone/>
             </a:pPr>
             <a:r>
-              <a:rPr/>
               <a:t>A </a:t>
             </a:r>
             <a:r>
@@ -3672,7 +3641,6 @@
               <a:t>statistical model using data from across the country</a:t>
             </a:r>
             <a:r>
-              <a:rPr/>
               <a:t> is used to identify those counties that have more or less than the model expects the specific county to have.</a:t>
             </a:r>
           </a:p>
@@ -3680,6 +3648,9 @@
       </p:sp>
     </p:spTree>
   </p:cSld>
+  <p:clrMapOvr>
+    <a:masterClrMapping/>
+  </p:clrMapOvr>
 </p:sld>
 </file>
 
@@ -3715,27 +3686,18 @@
           <a:bodyPr/>
           <a:lstStyle/>
           <a:p>
-            <a:pPr lvl="0" marL="0" indent="0">
+            <a:pPr marL="0" lvl="0" indent="0">
               <a:buNone/>
             </a:pPr>
             <a:r>
-              <a:rPr/>
-              <a:t>County</a:t>
-            </a:r>
-            <a:r>
-              <a:rPr/>
-              <a:t> </a:t>
-            </a:r>
-            <a:r>
-              <a:rPr/>
-              <a:t>Map</a:t>
+              <a:t>County Map</a:t>
             </a:r>
           </a:p>
         </p:txBody>
       </p:sp>
       <p:pic>
         <p:nvPicPr>
-          <p:cNvPr descr="access-to-care-rmarkdown_files/figure-pptx/unnamed-chunk-1-1.png" id="0" name="Picture 1"/>
+          <p:cNvPr id="3" name="Picture 1" descr="access-to-care-rmarkdown_files/figure-pptx/unnamed-chunk-1-1.png"/>
           <p:cNvPicPr>
             <a:picLocks noGrp="1" noChangeAspect="1"/>
           </p:cNvPicPr>
@@ -3765,6 +3727,9 @@
       </p:pic>
     </p:spTree>
   </p:cSld>
+  <p:clrMapOvr>
+    <a:masterClrMapping/>
+  </p:clrMapOvr>
 </p:sld>
 </file>
 
@@ -3800,20 +3765,11 @@
           <a:bodyPr/>
           <a:lstStyle/>
           <a:p>
-            <a:pPr lvl="0" marL="0" indent="0">
+            <a:pPr marL="0" lvl="0" indent="0">
               <a:buNone/>
             </a:pPr>
             <a:r>
-              <a:rPr/>
-              <a:t>County</a:t>
-            </a:r>
-            <a:r>
-              <a:rPr/>
-              <a:t> </a:t>
-            </a:r>
-            <a:r>
-              <a:rPr/>
-              <a:t>Data</a:t>
+              <a:t>County Data</a:t>
             </a:r>
           </a:p>
         </p:txBody>
@@ -3839,16 +3795,15 @@
           <a:bodyPr/>
           <a:lstStyle/>
           <a:p>
-            <a:pPr lvl="0" marL="0" indent="0">
+            <a:pPr marL="0" lvl="0" indent="0">
               <a:buNone/>
             </a:pPr>
             <a:r>
-              <a:rPr/>
               <a:t>Counties with above or below the number of hostpitals expected.</a:t>
             </a:r>
           </a:p>
           <a:p>
-            <a:pPr lvl="0" marL="1270000" indent="0">
+            <a:pPr marL="1270000" lvl="0" indent="0">
               <a:buNone/>
             </a:pPr>
             <a:r>
@@ -3868,6 +3823,9 @@
       </p:sp>
     </p:spTree>
   </p:cSld>
+  <p:clrMapOvr>
+    <a:masterClrMapping/>
+  </p:clrMapOvr>
 </p:sld>
 </file>
 

</xml_diff>

<commit_message>
removes DT from PP by State
</commit_message>
<xml_diff>
--- a/powerpoint-state/access-to-care-rmarkdown.pptx
+++ b/powerpoint-state/access-to-care-rmarkdown.pptx
@@ -3828,7 +3828,31 @@
             </a:pPr>
             <a:r>
               <a:rPr/>
-              <a:t>Counties with above or below the number of hostpitals expected. </a:t>
+              <a:t>Counties with above or below the number of hostpitals expected.</a:t>
+            </a:r>
+          </a:p>
+          <a:p>
+            <a:pPr lvl="0" marL="1270000" indent="0">
+              <a:buNone/>
+            </a:pPr>
+            <a:r>
+              <a:rPr sz="1800">
+                <a:latin typeface="Courier"/>
+              </a:rPr>
+              <a:t>## # A tibble: 58 x 5
+##    County       Population Hospitals Expected `Model Result`
+##    &lt;chr&gt;        &lt;chr&gt;          &lt;dbl&gt;    &lt;dbl&gt; &lt;chr&gt;         
+##  1 Alameda      2M                13       11 Acceptable    
+##  2 Alpine       1K                 0        1 Acceptable    
+##  3 Amador       37K                1        1 Acceptable    
+##  4 Butte        225K               4        2 Acceptable    
+##  5 Calaveras    45K                1        1 Acceptable    
+##  6 Colusa       21K                0        1 Acceptable    
+##  7 Contra Costa 1M                 0        8 Under         
+##  8 Del Norte    27K                1        1 Acceptable    
+##  9 El Dorado    184K               2        2 Acceptable    
+## 10 Fresno       975K               7        7 Acceptable    
+## # … with 48 more rows</a:t>
             </a:r>
           </a:p>
         </p:txBody>

</xml_diff>